<commit_message>
update poster layout and fixes for power point
</commit_message>
<xml_diff>
--- a/Project/Mental Wellness Sentiment Analysis Presentation.pptx
+++ b/Project/Mental Wellness Sentiment Analysis Presentation.pptx
@@ -5359,7 +5359,7 @@
         </p:spPr>
         <p:txBody>
           <a:bodyPr>
-            <a:normAutofit lnSpcReduction="10000"/>
+            <a:normAutofit fontScale="92500" lnSpcReduction="20000"/>
           </a:bodyPr>
           <a:lstStyle/>
           <a:p>
@@ -5372,22 +5372,52 @@
             <a:pPr lvl="1"/>
             <a:r>
               <a:rPr lang="en-US" dirty="0" smtClean="0"/>
-              <a:t>Provide starting point for the therapist with new clients.</a:t>
-            </a:r>
+              <a:t>Provide </a:t>
+            </a:r>
+            <a:r>
+              <a:rPr lang="en-US" dirty="0" smtClean="0"/>
+              <a:t>a starting </a:t>
+            </a:r>
+            <a:r>
+              <a:rPr lang="en-US" dirty="0" smtClean="0"/>
+              <a:t>point for </a:t>
+            </a:r>
+            <a:r>
+              <a:rPr lang="en-US" dirty="0" smtClean="0"/>
+              <a:t>therapists </a:t>
+            </a:r>
+            <a:r>
+              <a:rPr lang="en-US" dirty="0" smtClean="0"/>
+              <a:t>with new </a:t>
+            </a:r>
+            <a:r>
+              <a:rPr lang="en-US" dirty="0" smtClean="0"/>
+              <a:t>clients</a:t>
+            </a:r>
+            <a:endParaRPr lang="en-US" dirty="0" smtClean="0"/>
           </a:p>
           <a:p>
             <a:pPr lvl="1"/>
             <a:r>
               <a:rPr lang="en-US" dirty="0" smtClean="0"/>
-              <a:t>Qualitative analysis experiences improvement</a:t>
+              <a:t>Automatically estimate person’s </a:t>
+            </a:r>
+            <a:r>
+              <a:rPr lang="en-US" dirty="0"/>
+              <a:t>mental wellness based </a:t>
+            </a:r>
+            <a:r>
+              <a:rPr lang="en-US" dirty="0" smtClean="0"/>
+              <a:t>on a text sample</a:t>
             </a:r>
           </a:p>
           <a:p>
             <a:pPr lvl="1"/>
             <a:r>
               <a:rPr lang="en-US" dirty="0" smtClean="0"/>
-              <a:t>Wanted to estimate person mental wellness based on text.</a:t>
-            </a:r>
+              <a:t>Improve the process of performing qualitative analysis</a:t>
+            </a:r>
+            <a:endParaRPr lang="en-US" dirty="0" smtClean="0"/>
           </a:p>
           <a:p>
             <a:r>
@@ -5406,14 +5436,43 @@
             <a:pPr lvl="1"/>
             <a:r>
               <a:rPr lang="en-US" dirty="0" smtClean="0"/>
-              <a:t>Organizes the data, then split the data into training set and validation set.</a:t>
-            </a:r>
+              <a:t>Organize </a:t>
+            </a:r>
+            <a:r>
+              <a:rPr lang="en-US" dirty="0" smtClean="0"/>
+              <a:t>the data, then split the data into training set and validation </a:t>
+            </a:r>
+            <a:r>
+              <a:rPr lang="en-US" dirty="0" smtClean="0"/>
+              <a:t>sets</a:t>
+            </a:r>
+            <a:endParaRPr lang="en-US" dirty="0" smtClean="0"/>
           </a:p>
           <a:p>
             <a:pPr lvl="1"/>
             <a:r>
               <a:rPr lang="en-US" dirty="0" smtClean="0"/>
-              <a:t>Feed the training data set into a RNN (Recurrent Neural Network) model, use validation data set to validate the accuracy of the model.</a:t>
+              <a:t>Feed the training data set into a RNN (Recurrent Neural Network</a:t>
+            </a:r>
+            <a:r>
+              <a:rPr lang="en-US" smtClean="0"/>
+              <a:t>) </a:t>
+            </a:r>
+            <a:r>
+              <a:rPr lang="en-US" smtClean="0"/>
+              <a:t>LSTM model</a:t>
+            </a:r>
+            <a:r>
+              <a:rPr lang="en-US" dirty="0" smtClean="0"/>
+              <a:t>, use validation data set to validate the accuracy of the </a:t>
+            </a:r>
+            <a:r>
+              <a:rPr lang="en-US" dirty="0" smtClean="0"/>
+              <a:t>trained model</a:t>
+            </a:r>
+            <a:r>
+              <a:rPr lang="en-US" dirty="0" smtClean="0"/>
+              <a:t>.</a:t>
             </a:r>
           </a:p>
           <a:p>
@@ -5424,11 +5483,15 @@
             </a:r>
             <a:r>
               <a:rPr lang="en-US" dirty="0" err="1" smtClean="0"/>
-              <a:t>hyperparamters</a:t>
-            </a:r>
-            <a:r>
-              <a:rPr lang="en-US" dirty="0"/>
-              <a:t>.</a:t>
+              <a:t>hyperparameters</a:t>
+            </a:r>
+            <a:r>
+              <a:rPr lang="en-US" dirty="0" smtClean="0"/>
+              <a:t> to improve validation accuracy</a:t>
+            </a:r>
+            <a:r>
+              <a:rPr lang="en-US" dirty="0" smtClean="0"/>
+              <a:t>, such as number of layers, regularization via dropout</a:t>
             </a:r>
             <a:endParaRPr lang="en-US" dirty="0" smtClean="0"/>
           </a:p>

</xml_diff>